<commit_message>
Histórico, Fixes traslado, Facturación, Tests Email
</commit_message>
<xml_diff>
--- a/uploads/informes/1/11.pptx
+++ b/uploads/informes/1/11.pptx
@@ -2965,13 +2965,13 @@
           <a:p>
             <a:pPr algn="ctr" fontAlgn="base" marL="0" marR="0" indent="0" lvl="0"/>
             <a:r>
-              <a:rPr b="true" i="false" strike="noStrike" sz="2500" u="none">
+              <a:rPr b="true" i="false" strike="noStrike" sz="2200" u="none">
                 <a:solidFill>
                   <a:srgbClr val="000000"/>
                 </a:solidFill>
                 <a:latin typeface="Calibri"/>
               </a:rPr>
-              <a:t><![CDATA[Visita Punto Calle 220013 2014-08-22]]></a:t>
+              <a:t><![CDATA[Informe Solicitud de Mantencion de Muebles]]></a:t>
             </a:r>
           </a:p>
         </p:txBody>
@@ -2979,6 +2979,38 @@
       <p:sp>
         <p:nvSpPr>
           <p:cNvPr id="2" name=""/>
+          <p:cNvSpPr txBox="1"/>
+          <p:nvPr/>
+        </p:nvSpPr>
+        <p:spPr>
+          <a:xfrm rot="0">
+            <a:off x="1143000" y="952500"/>
+            <a:ext cx="5715000" cy="2857500"/>
+          </a:xfrm>
+          <a:prstGeom prst="rect"/>
+        </p:spPr>
+        <p:txBody>
+          <a:bodyPr wrap="square" rtlCol="0" horzOverflow="overflow" vertOverflow="overflow" bIns="45720" lIns="91440" rIns="91440" tIns="45720" numCol="1">
+            <a:spAutoFit/>
+          </a:bodyPr>
+          <a:lstStyle/>
+          <a:p>
+            <a:pPr algn="l" fontAlgn="base" marL="0" marR="0" indent="0" lvl="0"/>
+            <a:r>
+              <a:rPr b="false" i="false" strike="noStrike" sz="1600" u="none">
+                <a:solidFill>
+                  <a:srgbClr val="000000"/>
+                </a:solidFill>
+                <a:latin typeface="Calibri"/>
+              </a:rPr>
+              <a:t><![CDATA[Folio: R0000011]]></a:t>
+            </a:r>
+          </a:p>
+        </p:txBody>
+      </p:sp>
+      <p:sp>
+        <p:nvSpPr>
+          <p:cNvPr id="3" name=""/>
           <p:cNvSpPr txBox="1"/>
           <p:nvPr/>
         </p:nvSpPr>
@@ -2997,6 +3029,198 @@
           <a:p>
             <a:pPr algn="l" fontAlgn="base" marL="0" marR="0" indent="0" lvl="0"/>
             <a:r>
+              <a:rPr b="false" i="false" strike="noStrike" sz="1400" u="none">
+                <a:solidFill>
+                  <a:srgbClr val="000000"/>
+                </a:solidFill>
+                <a:latin typeface="Calibri"/>
+              </a:rPr>
+              <a:t><![CDATA[Punto: AVDA. AMÉRICO VESPUCIO 1501 RIPLEY TOLTÉN]]></a:t>
+            </a:r>
+          </a:p>
+        </p:txBody>
+      </p:sp>
+      <p:sp>
+        <p:nvSpPr>
+          <p:cNvPr id="4" name=""/>
+          <p:cNvSpPr txBox="1"/>
+          <p:nvPr/>
+        </p:nvSpPr>
+        <p:spPr>
+          <a:xfrm rot="0">
+            <a:off x="1143000" y="1333500"/>
+            <a:ext cx="5715000" cy="2857500"/>
+          </a:xfrm>
+          <a:prstGeom prst="rect"/>
+        </p:spPr>
+        <p:txBody>
+          <a:bodyPr wrap="square" rtlCol="0" horzOverflow="overflow" vertOverflow="overflow" bIns="45720" lIns="91440" rIns="91440" tIns="45720" numCol="1">
+            <a:spAutoFit/>
+          </a:bodyPr>
+          <a:lstStyle/>
+          <a:p>
+            <a:pPr algn="l" fontAlgn="base" marL="0" marR="0" indent="0" lvl="0"/>
+            <a:r>
+              <a:rPr b="false" i="false" strike="noStrike" sz="1400" u="none">
+                <a:solidFill>
+                  <a:srgbClr val="000000"/>
+                </a:solidFill>
+                <a:latin typeface="Calibri"/>
+              </a:rPr>
+              <a:t><![CDATA[Canal: GENERICO]]></a:t>
+            </a:r>
+          </a:p>
+        </p:txBody>
+      </p:sp>
+      <p:sp>
+        <p:nvSpPr>
+          <p:cNvPr id="5" name=""/>
+          <p:cNvSpPr txBox="1"/>
+          <p:nvPr/>
+        </p:nvSpPr>
+        <p:spPr>
+          <a:xfrm rot="0">
+            <a:off x="1143000" y="1524000"/>
+            <a:ext cx="5715000" cy="2857500"/>
+          </a:xfrm>
+          <a:prstGeom prst="rect"/>
+        </p:spPr>
+        <p:txBody>
+          <a:bodyPr wrap="square" rtlCol="0" horzOverflow="overflow" vertOverflow="overflow" bIns="45720" lIns="91440" rIns="91440" tIns="45720" numCol="1">
+            <a:spAutoFit/>
+          </a:bodyPr>
+          <a:lstStyle/>
+          <a:p>
+            <a:pPr algn="l" fontAlgn="base" marL="0" marR="0" indent="0" lvl="0"/>
+            <a:r>
+              <a:rPr b="false" i="false" strike="noStrike" sz="1400" u="none">
+                <a:solidFill>
+                  <a:srgbClr val="000000"/>
+                </a:solidFill>
+                <a:latin typeface="Calibri"/>
+              </a:rPr>
+              <a:t><![CDATA[Distribuidor: ROYM]]></a:t>
+            </a:r>
+          </a:p>
+        </p:txBody>
+      </p:sp>
+      <p:sp>
+        <p:nvSpPr>
+          <p:cNvPr id="6" name=""/>
+          <p:cNvSpPr txBox="1"/>
+          <p:nvPr/>
+        </p:nvSpPr>
+        <p:spPr>
+          <a:xfrm rot="0">
+            <a:off x="1143000" y="1714500"/>
+            <a:ext cx="5715000" cy="2857500"/>
+          </a:xfrm>
+          <a:prstGeom prst="rect"/>
+        </p:spPr>
+        <p:txBody>
+          <a:bodyPr wrap="square" rtlCol="0" horzOverflow="overflow" vertOverflow="overflow" bIns="45720" lIns="91440" rIns="91440" tIns="45720" numCol="1">
+            <a:spAutoFit/>
+          </a:bodyPr>
+          <a:lstStyle/>
+          <a:p>
+            <a:pPr algn="l" fontAlgn="base" marL="0" marR="0" indent="0" lvl="0"/>
+            <a:r>
+              <a:rPr b="false" i="false" strike="noStrike" sz="1400" u="none">
+                <a:solidFill>
+                  <a:srgbClr val="000000"/>
+                </a:solidFill>
+                <a:latin typeface="Calibri"/>
+              </a:rPr>
+              <a:t><![CDATA[Fecha Ingreso: 2014-08-21 00:00:00]]></a:t>
+            </a:r>
+          </a:p>
+        </p:txBody>
+      </p:sp>
+      <p:sp>
+        <p:nvSpPr>
+          <p:cNvPr id="7" name=""/>
+          <p:cNvSpPr txBox="1"/>
+          <p:nvPr/>
+        </p:nvSpPr>
+        <p:spPr>
+          <a:xfrm rot="0">
+            <a:off x="1143000" y="1905000"/>
+            <a:ext cx="5715000" cy="2857500"/>
+          </a:xfrm>
+          <a:prstGeom prst="rect"/>
+        </p:spPr>
+        <p:txBody>
+          <a:bodyPr wrap="square" rtlCol="0" horzOverflow="overflow" vertOverflow="overflow" bIns="45720" lIns="91440" rIns="91440" tIns="45720" numCol="1">
+            <a:spAutoFit/>
+          </a:bodyPr>
+          <a:lstStyle/>
+          <a:p>
+            <a:pPr algn="l" fontAlgn="base" marL="0" marR="0" indent="0" lvl="0"/>
+            <a:r>
+              <a:rPr b="false" i="false" strike="noStrike" sz="1400" u="none">
+                <a:solidFill>
+                  <a:srgbClr val="000000"/>
+                </a:solidFill>
+                <a:latin typeface="Calibri"/>
+              </a:rPr>
+              <a:t><![CDATA[Fecha Ejecución: 2014-08-22]]></a:t>
+            </a:r>
+          </a:p>
+        </p:txBody>
+      </p:sp>
+      <p:sp>
+        <p:nvSpPr>
+          <p:cNvPr id="8" name=""/>
+          <p:cNvSpPr txBox="1"/>
+          <p:nvPr/>
+        </p:nvSpPr>
+        <p:spPr>
+          <a:xfrm rot="0">
+            <a:off x="1143000" y="2095500"/>
+            <a:ext cx="5715000" cy="2857500"/>
+          </a:xfrm>
+          <a:prstGeom prst="rect"/>
+        </p:spPr>
+        <p:txBody>
+          <a:bodyPr wrap="square" rtlCol="0" horzOverflow="overflow" vertOverflow="overflow" bIns="45720" lIns="91440" rIns="91440" tIns="45720" numCol="1">
+            <a:spAutoFit/>
+          </a:bodyPr>
+          <a:lstStyle/>
+          <a:p>
+            <a:pPr algn="l" fontAlgn="base" marL="0" marR="0" indent="0" lvl="0"/>
+            <a:r>
+              <a:rPr b="false" i="false" strike="noStrike" sz="1400" u="none">
+                <a:solidFill>
+                  <a:srgbClr val="000000"/>
+                </a:solidFill>
+                <a:latin typeface="Calibri"/>
+              </a:rPr>
+              <a:t><![CDATA[Solicitante: Persona Prueba]]></a:t>
+            </a:r>
+          </a:p>
+        </p:txBody>
+      </p:sp>
+      <p:sp>
+        <p:nvSpPr>
+          <p:cNvPr id="9" name=""/>
+          <p:cNvSpPr txBox="1"/>
+          <p:nvPr/>
+        </p:nvSpPr>
+        <p:spPr>
+          <a:xfrm rot="0">
+            <a:off x="1143000" y="2286000"/>
+            <a:ext cx="5715000" cy="2857500"/>
+          </a:xfrm>
+          <a:prstGeom prst="rect"/>
+        </p:spPr>
+        <p:txBody>
+          <a:bodyPr wrap="square" rtlCol="0" horzOverflow="overflow" vertOverflow="overflow" bIns="45720" lIns="91440" rIns="91440" tIns="45720" numCol="1">
+            <a:spAutoFit/>
+          </a:bodyPr>
+          <a:lstStyle/>
+          <a:p>
+            <a:pPr algn="l" fontAlgn="base" marL="0" marR="0" indent="0" lvl="0"/>
+            <a:r>
               <a:rPr b="true" i="false" strike="noStrike" sz="2000" u="none">
                 <a:solidFill>
                   <a:srgbClr val="000000"/>
@@ -3010,14 +3234,14 @@
       </p:sp>
       <p:graphicFrame>
         <p:nvGraphicFramePr>
-          <p:cNvPr id="3" name="" descr=""/>
+          <p:cNvPr id="10" name="" descr=""/>
           <p:cNvGraphicFramePr>
             <a:graphicFrameLocks noGrp="1"/>
           </p:cNvGraphicFramePr>
           <p:nvPr/>
         </p:nvGraphicFramePr>
         <p:xfrm>
-          <a:off x="1143000" y="1714500"/>
+          <a:off x="1143000" y="2857500"/>
           <a:ext cx="6667500" cy="1905000"/>
         </p:xfrm>
         <a:graphic>
@@ -3266,7 +3490,7 @@
                     <a:p>
                       <a:pPr algn="l" fontAlgn="base" marL="0" marR="0" indent="0" lvl="0"/>
                       <a:r>
-                        <a:rPr b="false" i="false" strike="noStrike" sz="1200" u="none">
+                        <a:rPr b="false" i="false" strike="noStrike" sz="1000" u="none">
                           <a:solidFill>
                             <a:srgbClr val="000000"/>
                           </a:solidFill>
@@ -3341,7 +3565,7 @@
                     <a:p>
                       <a:pPr algn="l" fontAlgn="base" marL="0" marR="0" indent="0" lvl="0"/>
                       <a:r>
-                        <a:rPr b="false" i="false" strike="noStrike" sz="1200" u="none">
+                        <a:rPr b="false" i="false" strike="noStrike" sz="1000" u="none">
                           <a:solidFill>
                             <a:srgbClr val="000000"/>
                           </a:solidFill>
@@ -3416,7 +3640,7 @@
                     <a:p>
                       <a:pPr algn="l" fontAlgn="base" marL="0" marR="0" indent="0" lvl="0"/>
                       <a:r>
-                        <a:rPr b="false" i="false" strike="noStrike" sz="1200" u="none">
+                        <a:rPr b="false" i="false" strike="noStrike" sz="1000" u="none">
                           <a:solidFill>
                             <a:srgbClr val="000000"/>
                           </a:solidFill>
@@ -3493,7 +3717,7 @@
                     <a:p>
                       <a:pPr algn="l" fontAlgn="base" marL="0" marR="0" indent="0" lvl="0"/>
                       <a:r>
-                        <a:rPr b="false" i="false" strike="noStrike" sz="1200" u="none">
+                        <a:rPr b="false" i="false" strike="noStrike" sz="1000" u="none">
                           <a:solidFill>
                             <a:srgbClr val="000000"/>
                           </a:solidFill>
@@ -3568,7 +3792,7 @@
                     <a:p>
                       <a:pPr algn="l" fontAlgn="base" marL="0" marR="0" indent="0" lvl="0"/>
                       <a:r>
-                        <a:rPr b="false" i="false" strike="noStrike" sz="1200" u="none">
+                        <a:rPr b="false" i="false" strike="noStrike" sz="1000" u="none">
                           <a:solidFill>
                             <a:srgbClr val="000000"/>
                           </a:solidFill>
@@ -3643,7 +3867,7 @@
                     <a:p>
                       <a:pPr algn="l" fontAlgn="base" marL="0" marR="0" indent="0" lvl="0"/>
                       <a:r>
-                        <a:rPr b="false" i="false" strike="noStrike" sz="1200" u="none">
+                        <a:rPr b="false" i="false" strike="noStrike" sz="1000" u="none">
                           <a:solidFill>
                             <a:srgbClr val="000000"/>
                           </a:solidFill>
@@ -3781,7 +4005,7 @@
                     <a:p>
                       <a:pPr algn="r" fontAlgn="base" marL="0" marR="0" indent="0" lvl="0"/>
                       <a:r>
-                        <a:rPr b="false" i="false" strike="noStrike" sz="1200" u="none">
+                        <a:rPr b="false" i="false" strike="noStrike" sz="1000" u="none">
                           <a:solidFill>
                             <a:srgbClr val="000000"/>
                           </a:solidFill>
@@ -3851,7 +4075,7 @@
                     <a:p>
                       <a:pPr algn="l" fontAlgn="base" marL="0" marR="0" indent="0" lvl="0"/>
                       <a:r>
-                        <a:rPr b="true" i="false" strike="noStrike" sz="1200" u="none">
+                        <a:rPr b="true" i="false" strike="noStrike" sz="1000" u="none">
                           <a:solidFill>
                             <a:srgbClr val="000000"/>
                           </a:solidFill>
@@ -3921,7 +4145,7 @@
       </p:graphicFrame>
       <p:sp>
         <p:nvSpPr>
-          <p:cNvPr id="4" name=""/>
+          <p:cNvPr id="11" name=""/>
           <p:cNvSpPr txBox="1"/>
           <p:nvPr/>
         </p:nvSpPr>
@@ -3953,7 +4177,7 @@
       </p:sp>
       <p:sp>
         <p:nvSpPr>
-          <p:cNvPr id="5" name=""/>
+          <p:cNvPr id="12" name=""/>
           <p:cNvSpPr txBox="1"/>
           <p:nvPr/>
         </p:nvSpPr>

</xml_diff>